<commit_message>
Fix selection color when the language is Italian
</commit_message>
<xml_diff>
--- a/documentation/EuroDict.pptx
+++ b/documentation/EuroDict.pptx
@@ -27,11 +27,15 @@
       <p:boldItalic r:id="rId13"/>
     </p:embeddedFont>
     <p:embeddedFont>
+      <p:font typeface="JetBrains Mono" panose="02000009000000000000" pitchFamily="49" charset="0"/>
+      <p:regular r:id="rId14"/>
+    </p:embeddedFont>
+    <p:embeddedFont>
       <p:font typeface="Josefin Sans" pitchFamily="2" charset="0"/>
-      <p:regular r:id="rId14"/>
-      <p:bold r:id="rId15"/>
-      <p:italic r:id="rId16"/>
-      <p:boldItalic r:id="rId17"/>
+      <p:regular r:id="rId15"/>
+      <p:bold r:id="rId16"/>
+      <p:italic r:id="rId17"/>
+      <p:boldItalic r:id="rId18"/>
     </p:embeddedFont>
   </p:embeddedFontLst>
   <p:defaultTextStyle>
@@ -1904,6 +1908,84 @@
           </pc:sldLayoutMkLst>
         </pc:sldLayoutChg>
       </pc:sldMasterChg>
+    </pc:docChg>
+  </pc:docChgLst>
+  <pc:docChgLst>
+    <pc:chgData name="Lyubomir" userId="ad03ba5218a37c6f" providerId="LiveId" clId="{E125F29C-16E6-450E-84C4-49D887294387}"/>
+    <pc:docChg chg="custSel modSld">
+      <pc:chgData name="Lyubomir" userId="ad03ba5218a37c6f" providerId="LiveId" clId="{E125F29C-16E6-450E-84C4-49D887294387}" dt="2022-11-29T18:30:16.880" v="61" actId="2711"/>
+      <pc:docMkLst>
+        <pc:docMk/>
+      </pc:docMkLst>
+      <pc:sldChg chg="modSp mod">
+        <pc:chgData name="Lyubomir" userId="ad03ba5218a37c6f" providerId="LiveId" clId="{E125F29C-16E6-450E-84C4-49D887294387}" dt="2022-11-29T18:28:31.814" v="7" actId="1076"/>
+        <pc:sldMkLst>
+          <pc:docMk/>
+          <pc:sldMk cId="0" sldId="256"/>
+        </pc:sldMkLst>
+        <pc:spChg chg="mod">
+          <ac:chgData name="Lyubomir" userId="ad03ba5218a37c6f" providerId="LiveId" clId="{E125F29C-16E6-450E-84C4-49D887294387}" dt="2022-11-29T18:28:31.814" v="7" actId="1076"/>
+          <ac:spMkLst>
+            <pc:docMk/>
+            <pc:sldMk cId="0" sldId="256"/>
+            <ac:spMk id="663" creationId="{00000000-0000-0000-0000-000000000000}"/>
+          </ac:spMkLst>
+        </pc:spChg>
+        <pc:spChg chg="mod">
+          <ac:chgData name="Lyubomir" userId="ad03ba5218a37c6f" providerId="LiveId" clId="{E125F29C-16E6-450E-84C4-49D887294387}" dt="2022-11-29T18:28:09.573" v="2" actId="2711"/>
+          <ac:spMkLst>
+            <pc:docMk/>
+            <pc:sldMk cId="0" sldId="256"/>
+            <ac:spMk id="668" creationId="{00000000-0000-0000-0000-000000000000}"/>
+          </ac:spMkLst>
+        </pc:spChg>
+      </pc:sldChg>
+      <pc:sldChg chg="modSp mod">
+        <pc:chgData name="Lyubomir" userId="ad03ba5218a37c6f" providerId="LiveId" clId="{E125F29C-16E6-450E-84C4-49D887294387}" dt="2022-11-29T18:30:16.880" v="61" actId="2711"/>
+        <pc:sldMkLst>
+          <pc:docMk/>
+          <pc:sldMk cId="0" sldId="258"/>
+        </pc:sldMkLst>
+        <pc:spChg chg="mod">
+          <ac:chgData name="Lyubomir" userId="ad03ba5218a37c6f" providerId="LiveId" clId="{E125F29C-16E6-450E-84C4-49D887294387}" dt="2022-11-29T18:30:08.072" v="60" actId="2711"/>
+          <ac:spMkLst>
+            <pc:docMk/>
+            <pc:sldMk cId="0" sldId="258"/>
+            <ac:spMk id="12" creationId="{D24EAA4D-6DCE-7AA2-B0B3-4F55AE6EED26}"/>
+          </ac:spMkLst>
+        </pc:spChg>
+        <pc:spChg chg="mod">
+          <ac:chgData name="Lyubomir" userId="ad03ba5218a37c6f" providerId="LiveId" clId="{E125F29C-16E6-450E-84C4-49D887294387}" dt="2022-11-29T18:30:16.880" v="61" actId="2711"/>
+          <ac:spMkLst>
+            <pc:docMk/>
+            <pc:sldMk cId="0" sldId="258"/>
+            <ac:spMk id="696" creationId="{00000000-0000-0000-0000-000000000000}"/>
+          </ac:spMkLst>
+        </pc:spChg>
+      </pc:sldChg>
+      <pc:sldChg chg="modSp mod">
+        <pc:chgData name="Lyubomir" userId="ad03ba5218a37c6f" providerId="LiveId" clId="{E125F29C-16E6-450E-84C4-49D887294387}" dt="2022-11-29T18:29:52.412" v="59" actId="20577"/>
+        <pc:sldMkLst>
+          <pc:docMk/>
+          <pc:sldMk cId="0" sldId="265"/>
+        </pc:sldMkLst>
+        <pc:spChg chg="mod">
+          <ac:chgData name="Lyubomir" userId="ad03ba5218a37c6f" providerId="LiveId" clId="{E125F29C-16E6-450E-84C4-49D887294387}" dt="2022-11-29T18:29:52.412" v="59" actId="20577"/>
+          <ac:spMkLst>
+            <pc:docMk/>
+            <pc:sldMk cId="0" sldId="265"/>
+            <ac:spMk id="788" creationId="{00000000-0000-0000-0000-000000000000}"/>
+          </ac:spMkLst>
+        </pc:spChg>
+        <pc:spChg chg="mod">
+          <ac:chgData name="Lyubomir" userId="ad03ba5218a37c6f" providerId="LiveId" clId="{E125F29C-16E6-450E-84C4-49D887294387}" dt="2022-11-29T18:28:40.714" v="8" actId="2711"/>
+          <ac:spMkLst>
+            <pc:docMk/>
+            <pc:sldMk cId="0" sldId="265"/>
+            <ac:spMk id="803" creationId="{00000000-0000-0000-0000-000000000000}"/>
+          </ac:spMkLst>
+        </pc:spChg>
+      </pc:sldChg>
     </pc:docChg>
   </pc:docChgLst>
 </pc:chgInfo>
@@ -28548,8 +28630,8 @@
         </p:nvSpPr>
         <p:spPr>
           <a:xfrm>
-            <a:off x="2307750" y="2984188"/>
-            <a:ext cx="4528500" cy="1292812"/>
+            <a:off x="2398865" y="3202238"/>
+            <a:ext cx="4346269" cy="884427"/>
           </a:xfrm>
           <a:prstGeom prst="rect">
             <a:avLst/>
@@ -28571,25 +28653,33 @@
               <a:buNone/>
             </a:pPr>
             <a:r>
-              <a:rPr lang="bg-BG" sz="1800" dirty="0">
-                <a:latin typeface="Century Gothic" panose="020B0502020202020204" pitchFamily="34" charset="0"/>
+              <a:rPr lang="bg-BG" dirty="0">
+                <a:latin typeface="JetBrains Mono" panose="02000009000000000000" pitchFamily="49" charset="0"/>
+                <a:ea typeface="JetBrains Mono" panose="02000009000000000000" pitchFamily="49" charset="0"/>
+                <a:cs typeface="JetBrains Mono" panose="02000009000000000000" pitchFamily="49" charset="0"/>
               </a:rPr>
               <a:t>Автор</a:t>
             </a:r>
             <a:r>
-              <a:rPr lang="en-GB" sz="1800" dirty="0">
-                <a:latin typeface="Century Gothic" panose="020B0502020202020204" pitchFamily="34" charset="0"/>
+              <a:rPr lang="en-GB" dirty="0">
+                <a:latin typeface="JetBrains Mono" panose="02000009000000000000" pitchFamily="49" charset="0"/>
+                <a:ea typeface="JetBrains Mono" panose="02000009000000000000" pitchFamily="49" charset="0"/>
+                <a:cs typeface="JetBrains Mono" panose="02000009000000000000" pitchFamily="49" charset="0"/>
               </a:rPr>
               <a:t>: </a:t>
             </a:r>
             <a:r>
-              <a:rPr lang="bg-BG" sz="1800" dirty="0">
-                <a:latin typeface="Century Gothic" panose="020B0502020202020204" pitchFamily="34" charset="0"/>
+              <a:rPr lang="bg-BG" dirty="0">
+                <a:latin typeface="JetBrains Mono" panose="02000009000000000000" pitchFamily="49" charset="0"/>
+                <a:ea typeface="JetBrains Mono" panose="02000009000000000000" pitchFamily="49" charset="0"/>
+                <a:cs typeface="JetBrains Mono" panose="02000009000000000000" pitchFamily="49" charset="0"/>
               </a:rPr>
               <a:t>Любомир Романов</a:t>
             </a:r>
-            <a:endParaRPr lang="ru-RU" sz="1800" dirty="0">
-              <a:latin typeface="Century Gothic" panose="020B0502020202020204" pitchFamily="34" charset="0"/>
+            <a:endParaRPr lang="ru-RU" dirty="0">
+              <a:latin typeface="JetBrains Mono" panose="02000009000000000000" pitchFamily="49" charset="0"/>
+              <a:ea typeface="JetBrains Mono" panose="02000009000000000000" pitchFamily="49" charset="0"/>
+              <a:cs typeface="JetBrains Mono" panose="02000009000000000000" pitchFamily="49" charset="0"/>
             </a:endParaRPr>
           </a:p>
           <a:p>
@@ -28603,13 +28693,17 @@
               <a:buNone/>
             </a:pPr>
             <a:r>
-              <a:rPr lang="bg-BG" sz="1800" dirty="0">
-                <a:latin typeface="Century Gothic" panose="020B0502020202020204" pitchFamily="34" charset="0"/>
+              <a:rPr lang="bg-BG" dirty="0">
+                <a:latin typeface="JetBrains Mono" panose="02000009000000000000" pitchFamily="49" charset="0"/>
+                <a:ea typeface="JetBrains Mono" panose="02000009000000000000" pitchFamily="49" charset="0"/>
+                <a:cs typeface="JetBrains Mono" panose="02000009000000000000" pitchFamily="49" charset="0"/>
               </a:rPr>
               <a:t>МГ „Академик Кирил Попов“ 11В</a:t>
             </a:r>
-            <a:endParaRPr lang="ru-RU" sz="1800" dirty="0">
-              <a:latin typeface="Century Gothic" panose="020B0502020202020204" pitchFamily="34" charset="0"/>
+            <a:endParaRPr lang="ru-RU" dirty="0">
+              <a:latin typeface="JetBrains Mono" panose="02000009000000000000" pitchFamily="49" charset="0"/>
+              <a:ea typeface="JetBrains Mono" panose="02000009000000000000" pitchFamily="49" charset="0"/>
+              <a:cs typeface="JetBrains Mono" panose="02000009000000000000" pitchFamily="49" charset="0"/>
             </a:endParaRPr>
           </a:p>
           <a:p>
@@ -28623,8 +28717,10 @@
               <a:buNone/>
             </a:pPr>
             <a:r>
-              <a:rPr lang="es-ES" sz="1800" dirty="0">
-                <a:latin typeface="Century Gothic" panose="020B0502020202020204" pitchFamily="34" charset="0"/>
+              <a:rPr lang="es-ES" dirty="0">
+                <a:latin typeface="JetBrains Mono" panose="02000009000000000000" pitchFamily="49" charset="0"/>
+                <a:ea typeface="JetBrains Mono" panose="02000009000000000000" pitchFamily="49" charset="0"/>
+                <a:cs typeface="JetBrains Mono" panose="02000009000000000000" pitchFamily="49" charset="0"/>
               </a:rPr>
               <a:t>https://italiandict.herokuapp.com/</a:t>
             </a:r>
@@ -28902,7 +28998,9 @@
                 <a:solidFill>
                   <a:schemeClr val="accent1"/>
                 </a:solidFill>
-                <a:latin typeface="Century Gothic" panose="020B0502020202020204" pitchFamily="34" charset="0"/>
+                <a:latin typeface="JetBrains Mono" panose="02000009000000000000" pitchFamily="49" charset="0"/>
+                <a:ea typeface="JetBrains Mono" panose="02000009000000000000" pitchFamily="49" charset="0"/>
+                <a:cs typeface="JetBrains Mono" panose="02000009000000000000" pitchFamily="49" charset="0"/>
               </a:rPr>
               <a:t>EuroDict</a:t>
             </a:r>
@@ -28910,7 +29008,9 @@
               <a:solidFill>
                 <a:schemeClr val="accent2"/>
               </a:solidFill>
-              <a:latin typeface="Century Gothic" panose="020B0502020202020204" pitchFamily="34" charset="0"/>
+              <a:latin typeface="JetBrains Mono" panose="02000009000000000000" pitchFamily="49" charset="0"/>
+              <a:ea typeface="JetBrains Mono" panose="02000009000000000000" pitchFamily="49" charset="0"/>
+              <a:cs typeface="JetBrains Mono" panose="02000009000000000000" pitchFamily="49" charset="0"/>
             </a:endParaRPr>
           </a:p>
         </p:txBody>
@@ -29023,19 +29123,57 @@
             </a:pPr>
             <a:r>
               <a:rPr lang="ru-RU" dirty="0">
-                <a:latin typeface="Century Gothic" panose="020B0502020202020204" pitchFamily="34" charset="0"/>
+                <a:latin typeface="JetBrains Mono" panose="02000009000000000000" pitchFamily="49" charset="0"/>
+                <a:ea typeface="JetBrains Mono" panose="02000009000000000000" pitchFamily="49" charset="0"/>
+                <a:cs typeface="JetBrains Mono" panose="02000009000000000000" pitchFamily="49" charset="0"/>
               </a:rPr>
-              <a:t>&gt; Проектът “ItalianDict” представлява самообучаваща програма за учене на </a:t>
+              <a:t>&gt; Проектът </a:t>
+            </a:r>
+            <a:r>
+              <a:rPr lang="en-US" dirty="0">
+                <a:latin typeface="JetBrains Mono" panose="02000009000000000000" pitchFamily="49" charset="0"/>
+                <a:ea typeface="JetBrains Mono" panose="02000009000000000000" pitchFamily="49" charset="0"/>
+                <a:cs typeface="JetBrains Mono" panose="02000009000000000000" pitchFamily="49" charset="0"/>
+              </a:rPr>
+              <a:t>"</a:t>
+            </a:r>
+            <a:r>
+              <a:rPr lang="ru-RU" dirty="0">
+                <a:latin typeface="JetBrains Mono" panose="02000009000000000000" pitchFamily="49" charset="0"/>
+                <a:ea typeface="JetBrains Mono" panose="02000009000000000000" pitchFamily="49" charset="0"/>
+                <a:cs typeface="JetBrains Mono" panose="02000009000000000000" pitchFamily="49" charset="0"/>
+              </a:rPr>
+              <a:t>ItalianDict</a:t>
+            </a:r>
+            <a:r>
+              <a:rPr lang="en-US" dirty="0">
+                <a:latin typeface="JetBrains Mono" panose="02000009000000000000" pitchFamily="49" charset="0"/>
+                <a:ea typeface="JetBrains Mono" panose="02000009000000000000" pitchFamily="49" charset="0"/>
+                <a:cs typeface="JetBrains Mono" panose="02000009000000000000" pitchFamily="49" charset="0"/>
+              </a:rPr>
+              <a:t>"</a:t>
+            </a:r>
+            <a:r>
+              <a:rPr lang="ru-RU" dirty="0">
+                <a:latin typeface="JetBrains Mono" panose="02000009000000000000" pitchFamily="49" charset="0"/>
+                <a:ea typeface="JetBrains Mono" panose="02000009000000000000" pitchFamily="49" charset="0"/>
+                <a:cs typeface="JetBrains Mono" panose="02000009000000000000" pitchFamily="49" charset="0"/>
+              </a:rPr>
+              <a:t> представлява самообучаваща програма за учене на </a:t>
             </a:r>
             <a:r>
               <a:rPr lang="bg-BG" dirty="0">
-                <a:latin typeface="Century Gothic" panose="020B0502020202020204" pitchFamily="34" charset="0"/>
+                <a:latin typeface="JetBrains Mono" panose="02000009000000000000" pitchFamily="49" charset="0"/>
+                <a:ea typeface="JetBrains Mono" panose="02000009000000000000" pitchFamily="49" charset="0"/>
+                <a:cs typeface="JetBrains Mono" panose="02000009000000000000" pitchFamily="49" charset="0"/>
               </a:rPr>
               <a:t>чужди</a:t>
             </a:r>
             <a:r>
               <a:rPr lang="ru-RU" dirty="0">
-                <a:latin typeface="Century Gothic" panose="020B0502020202020204" pitchFamily="34" charset="0"/>
+                <a:latin typeface="JetBrains Mono" panose="02000009000000000000" pitchFamily="49" charset="0"/>
+                <a:ea typeface="JetBrains Mono" panose="02000009000000000000" pitchFamily="49" charset="0"/>
+                <a:cs typeface="JetBrains Mono" panose="02000009000000000000" pitchFamily="49" charset="0"/>
               </a:rPr>
               <a:t> езици със свободен достъп в интернет.</a:t>
             </a:r>
@@ -29052,9 +29190,11 @@
             </a:pPr>
             <a:r>
               <a:rPr lang="ru-RU" dirty="0">
-                <a:latin typeface="Century Gothic" panose="020B0502020202020204" pitchFamily="34" charset="0"/>
+                <a:latin typeface="JetBrains Mono" panose="02000009000000000000" pitchFamily="49" charset="0"/>
+                <a:ea typeface="JetBrains Mono" panose="02000009000000000000" pitchFamily="49" charset="0"/>
+                <a:cs typeface="JetBrains Mono" panose="02000009000000000000" pitchFamily="49" charset="0"/>
               </a:rPr>
-              <a:t>&gt; Създаден е с цел да представи по един различен и атрактивен начин изучавания материал в училище, както и да помага на заинтересовани потребители. </a:t>
+              <a:t>&gt; Създаден е с цел да представи по един различен и атрактивен начин изучавания материал в училище, както и да помага на заинтересовани потребители.</a:t>
             </a:r>
           </a:p>
         </p:txBody>
@@ -30214,12 +30354,16 @@
             </a:pPr>
             <a:r>
               <a:rPr lang="bg-BG" dirty="0">
-                <a:latin typeface="Century Gothic" panose="020B0502020202020204" pitchFamily="34" charset="0"/>
+                <a:latin typeface="JetBrains Mono" panose="02000009000000000000" pitchFamily="49" charset="0"/>
+                <a:ea typeface="JetBrains Mono" panose="02000009000000000000" pitchFamily="49" charset="0"/>
+                <a:cs typeface="JetBrains Mono" panose="02000009000000000000" pitchFamily="49" charset="0"/>
               </a:rPr>
               <a:t>Цел</a:t>
             </a:r>
             <a:endParaRPr dirty="0">
-              <a:latin typeface="Century Gothic" panose="020B0502020202020204" pitchFamily="34" charset="0"/>
+              <a:latin typeface="JetBrains Mono" panose="02000009000000000000" pitchFamily="49" charset="0"/>
+              <a:ea typeface="JetBrains Mono" panose="02000009000000000000" pitchFamily="49" charset="0"/>
+              <a:cs typeface="JetBrains Mono" panose="02000009000000000000" pitchFamily="49" charset="0"/>
             </a:endParaRPr>
           </a:p>
         </p:txBody>
@@ -30525,10 +30669,18 @@
               <a:buNone/>
             </a:pPr>
             <a:r>
-              <a:rPr lang="en"/>
+              <a:rPr lang="en" dirty="0">
+                <a:latin typeface="JetBrains Mono" panose="02000009000000000000" pitchFamily="49" charset="0"/>
+                <a:ea typeface="JetBrains Mono" panose="02000009000000000000" pitchFamily="49" charset="0"/>
+                <a:cs typeface="JetBrains Mono" panose="02000009000000000000" pitchFamily="49" charset="0"/>
+              </a:rPr>
               <a:t>01</a:t>
             </a:r>
-            <a:endParaRPr/>
+            <a:endParaRPr dirty="0">
+              <a:latin typeface="JetBrains Mono" panose="02000009000000000000" pitchFamily="49" charset="0"/>
+              <a:ea typeface="JetBrains Mono" panose="02000009000000000000" pitchFamily="49" charset="0"/>
+              <a:cs typeface="JetBrains Mono" panose="02000009000000000000" pitchFamily="49" charset="0"/>
+            </a:endParaRPr>
           </a:p>
         </p:txBody>
       </p:sp>
@@ -31381,7 +31533,9 @@
             <a:pPr algn="ctr"/>
             <a:r>
               <a:rPr lang="ru-RU" dirty="0">
-                <a:latin typeface="Century Gothic" panose="020B0502020202020204" pitchFamily="34" charset="0"/>
+                <a:latin typeface="JetBrains Mono" panose="02000009000000000000" pitchFamily="49" charset="0"/>
+                <a:ea typeface="JetBrains Mono" panose="02000009000000000000" pitchFamily="49" charset="0"/>
+                <a:cs typeface="JetBrains Mono" panose="02000009000000000000" pitchFamily="49" charset="0"/>
               </a:rPr>
               <a:t>Основни етапи в реализирането на проекта</a:t>
             </a:r>

</xml_diff>